<commit_message>
revise: small changes to Weekly Update
</commit_message>
<xml_diff>
--- a/docs/WeeklyUpdates/WeeklyUpdate_Nov16-20.pptx
+++ b/docs/WeeklyUpdates/WeeklyUpdate_Nov16-20.pptx
@@ -4014,17 +4014,26 @@
           </a:lstStyle>
           <a:p>
             <a:pPr marL="0" indent="0" algn="ctr">
-              <a:lnSpc>
-                <a:spcPct val="200000"/>
-              </a:lnSpc>
               <a:buFont typeface="Arial" pitchFamily="34" charset="0"/>
               <a:buNone/>
             </a:pPr>
             <a:r>
-              <a:rPr lang="en-US" altLang="ja-JP" sz="1900" dirty="0">
+              <a:rPr lang="en-US" altLang="ja-JP" sz="2400" u="sng" dirty="0">
                 <a:ea typeface="ＭＳ Ｐゴシック" pitchFamily="34" charset="-128"/>
               </a:rPr>
-              <a:t>Social Interactivity Mentor for Youth with Autism using the NAO Robot (SIMYAN)</a:t>
+              <a:t>Social Interactivity Mentor for Youth with Autism </a:t>
+            </a:r>
+          </a:p>
+          <a:p>
+            <a:pPr marL="0" indent="0" algn="ctr">
+              <a:buFont typeface="Arial" pitchFamily="34" charset="0"/>
+              <a:buNone/>
+            </a:pPr>
+            <a:r>
+              <a:rPr lang="en-US" altLang="ja-JP" sz="2400" u="sng" dirty="0">
+                <a:ea typeface="ＭＳ Ｐゴシック" pitchFamily="34" charset="-128"/>
+              </a:rPr>
+              <a:t>using the NAO Robot (SIMYAN)</a:t>
             </a:r>
           </a:p>
           <a:p>
@@ -4323,7 +4332,7 @@
           <a:p>
             <a:r>
               <a:rPr lang="en-US" dirty="0"/>
-              <a:t>Requirement specification begun</a:t>
+              <a:t>Requirement specifications begun</a:t>
             </a:r>
           </a:p>
           <a:p>
@@ -4461,7 +4470,7 @@
             <a:pPr lvl="1"/>
             <a:r>
               <a:rPr lang="en-US" dirty="0"/>
-              <a:t>Complete requirements specifications</a:t>
+              <a:t>Complete requirement specifications</a:t>
             </a:r>
           </a:p>
           <a:p>

</xml_diff>